<commit_message>
Issue 1329: Add UI testing guidelines description to GoogleDoc Update Issue 1329
</commit_message>
<xml_diff>
--- a/doc/diagrams/UI testing guidelines.pptx
+++ b/doc/diagrams/UI testing guidelines.pptx
@@ -4,6 +4,9 @@
   <p:sldMasterIdLst>
     <p:sldMasterId id="2147483648" r:id="rId1"/>
   </p:sldMasterIdLst>
+  <p:sldIdLst>
+    <p:sldId id="256" r:id="rId2"/>
+  </p:sldIdLst>
   <p:sldSz cx="9144000" cy="6858000" type="screen4x3"/>
   <p:notesSz cx="6858000" cy="9144000"/>
   <p:defaultTextStyle>
@@ -286,7 +289,7 @@
             <a:fld id="{1D8BD707-D9CF-40AE-B4C6-C98DA3205C09}" type="datetimeFigureOut">
               <a:rPr lang="en-US" smtClean="0"/>
               <a:pPr/>
-              <a:t>9/18/2006</a:t>
+              <a:t>12/18/2013</a:t>
             </a:fld>
             <a:endParaRPr lang="en-US"/>
           </a:p>
@@ -453,7 +456,7 @@
             <a:fld id="{1D8BD707-D9CF-40AE-B4C6-C98DA3205C09}" type="datetimeFigureOut">
               <a:rPr lang="en-US" smtClean="0"/>
               <a:pPr/>
-              <a:t>9/18/2006</a:t>
+              <a:t>12/18/2013</a:t>
             </a:fld>
             <a:endParaRPr lang="en-US"/>
           </a:p>
@@ -630,7 +633,7 @@
             <a:fld id="{1D8BD707-D9CF-40AE-B4C6-C98DA3205C09}" type="datetimeFigureOut">
               <a:rPr lang="en-US" smtClean="0"/>
               <a:pPr/>
-              <a:t>9/18/2006</a:t>
+              <a:t>12/18/2013</a:t>
             </a:fld>
             <a:endParaRPr lang="en-US"/>
           </a:p>
@@ -797,7 +800,7 @@
             <a:fld id="{1D8BD707-D9CF-40AE-B4C6-C98DA3205C09}" type="datetimeFigureOut">
               <a:rPr lang="en-US" smtClean="0"/>
               <a:pPr/>
-              <a:t>9/18/2006</a:t>
+              <a:t>12/18/2013</a:t>
             </a:fld>
             <a:endParaRPr lang="en-US"/>
           </a:p>
@@ -1040,7 +1043,7 @@
             <a:fld id="{1D8BD707-D9CF-40AE-B4C6-C98DA3205C09}" type="datetimeFigureOut">
               <a:rPr lang="en-US" smtClean="0"/>
               <a:pPr/>
-              <a:t>9/18/2006</a:t>
+              <a:t>12/18/2013</a:t>
             </a:fld>
             <a:endParaRPr lang="en-US"/>
           </a:p>
@@ -1325,7 +1328,7 @@
             <a:fld id="{1D8BD707-D9CF-40AE-B4C6-C98DA3205C09}" type="datetimeFigureOut">
               <a:rPr lang="en-US" smtClean="0"/>
               <a:pPr/>
-              <a:t>9/18/2006</a:t>
+              <a:t>12/18/2013</a:t>
             </a:fld>
             <a:endParaRPr lang="en-US"/>
           </a:p>
@@ -1744,7 +1747,7 @@
             <a:fld id="{1D8BD707-D9CF-40AE-B4C6-C98DA3205C09}" type="datetimeFigureOut">
               <a:rPr lang="en-US" smtClean="0"/>
               <a:pPr/>
-              <a:t>9/18/2006</a:t>
+              <a:t>12/18/2013</a:t>
             </a:fld>
             <a:endParaRPr lang="en-US"/>
           </a:p>
@@ -1859,7 +1862,7 @@
             <a:fld id="{1D8BD707-D9CF-40AE-B4C6-C98DA3205C09}" type="datetimeFigureOut">
               <a:rPr lang="en-US" smtClean="0"/>
               <a:pPr/>
-              <a:t>9/18/2006</a:t>
+              <a:t>12/18/2013</a:t>
             </a:fld>
             <a:endParaRPr lang="en-US"/>
           </a:p>
@@ -1951,7 +1954,7 @@
             <a:fld id="{1D8BD707-D9CF-40AE-B4C6-C98DA3205C09}" type="datetimeFigureOut">
               <a:rPr lang="en-US" smtClean="0"/>
               <a:pPr/>
-              <a:t>9/18/2006</a:t>
+              <a:t>12/18/2013</a:t>
             </a:fld>
             <a:endParaRPr lang="en-US"/>
           </a:p>
@@ -2225,7 +2228,7 @@
             <a:fld id="{1D8BD707-D9CF-40AE-B4C6-C98DA3205C09}" type="datetimeFigureOut">
               <a:rPr lang="en-US" smtClean="0"/>
               <a:pPr/>
-              <a:t>9/18/2006</a:t>
+              <a:t>12/18/2013</a:t>
             </a:fld>
             <a:endParaRPr lang="en-US"/>
           </a:p>
@@ -2475,7 +2478,7 @@
             <a:fld id="{1D8BD707-D9CF-40AE-B4C6-C98DA3205C09}" type="datetimeFigureOut">
               <a:rPr lang="en-US" smtClean="0"/>
               <a:pPr/>
-              <a:t>9/18/2006</a:t>
+              <a:t>12/18/2013</a:t>
             </a:fld>
             <a:endParaRPr lang="en-US"/>
           </a:p>
@@ -2685,7 +2688,7 @@
             <a:fld id="{1D8BD707-D9CF-40AE-B4C6-C98DA3205C09}" type="datetimeFigureOut">
               <a:rPr lang="en-US" smtClean="0"/>
               <a:pPr/>
-              <a:t>9/18/2006</a:t>
+              <a:t>12/18/2013</a:t>
             </a:fld>
             <a:endParaRPr lang="en-US"/>
           </a:p>
@@ -3037,6 +3040,569 @@
     </p:otherStyle>
   </p:txStyles>
 </p:sldMaster>
+</file>
+
+<file path=ppt/slides/slide1.xml><?xml version="1.0" encoding="utf-8"?>
+<p:sld xmlns:a="http://schemas.openxmlformats.org/drawingml/2006/main" xmlns:r="http://schemas.openxmlformats.org/officeDocument/2006/relationships" xmlns:p="http://schemas.openxmlformats.org/presentationml/2006/main">
+  <p:cSld>
+    <p:spTree>
+      <p:nvGrpSpPr>
+        <p:cNvPr id="1" name=""/>
+        <p:cNvGrpSpPr/>
+        <p:nvPr/>
+      </p:nvGrpSpPr>
+      <p:grpSpPr>
+        <a:xfrm>
+          <a:off x="0" y="0"/>
+          <a:ext cx="0" cy="0"/>
+          <a:chOff x="0" y="0"/>
+          <a:chExt cx="0" cy="0"/>
+        </a:xfrm>
+      </p:grpSpPr>
+      <p:grpSp>
+        <p:nvGrpSpPr>
+          <p:cNvPr id="14" name="Group 13"/>
+          <p:cNvGrpSpPr/>
+          <p:nvPr/>
+        </p:nvGrpSpPr>
+        <p:grpSpPr>
+          <a:xfrm>
+            <a:off x="77875" y="934453"/>
+            <a:ext cx="9008513" cy="4704347"/>
+            <a:chOff x="77875" y="934453"/>
+            <a:chExt cx="9008513" cy="4704347"/>
+          </a:xfrm>
+        </p:grpSpPr>
+        <p:pic>
+          <p:nvPicPr>
+            <p:cNvPr id="1027" name="Picture 3"/>
+            <p:cNvPicPr>
+              <a:picLocks noChangeAspect="1" noChangeArrowheads="1"/>
+            </p:cNvPicPr>
+            <p:nvPr/>
+          </p:nvPicPr>
+          <p:blipFill>
+            <a:blip r:embed="rId2">
+              <a:extLst>
+                <a:ext uri="{BEBA8EAE-BF5A-486C-A8C5-ECC9F3942E4B}">
+                  <a14:imgProps xmlns:a14="http://schemas.microsoft.com/office/drawing/2010/main">
+                    <a14:imgLayer r:embed="rId3">
+                      <a14:imgEffect>
+                        <a14:colorTemperature colorTemp="8800"/>
+                      </a14:imgEffect>
+                      <a14:imgEffect>
+                        <a14:saturation sat="0"/>
+                      </a14:imgEffect>
+                    </a14:imgLayer>
+                  </a14:imgProps>
+                </a:ext>
+                <a:ext uri="{28A0092B-C50C-407E-A947-70E740481C1C}">
+                  <a14:useLocalDpi xmlns:a14="http://schemas.microsoft.com/office/drawing/2010/main" val="0"/>
+                </a:ext>
+              </a:extLst>
+            </a:blip>
+            <a:srcRect/>
+            <a:stretch>
+              <a:fillRect/>
+            </a:stretch>
+          </p:blipFill>
+          <p:spPr bwMode="auto">
+            <a:xfrm>
+              <a:off x="125471" y="934453"/>
+              <a:ext cx="8960917" cy="4495800"/>
+            </a:xfrm>
+            <a:prstGeom prst="rect">
+              <a:avLst/>
+            </a:prstGeom>
+            <a:noFill/>
+            <a:ln>
+              <a:noFill/>
+            </a:ln>
+            <a:effectLst>
+              <a:outerShdw dist="35921" dir="2700000" algn="ctr" rotWithShape="0">
+                <a:schemeClr val="bg1"/>
+              </a:outerShdw>
+              <a:softEdge rad="63500"/>
+            </a:effectLst>
+            <a:extLst>
+              <a:ext uri="{909E8E84-426E-40DD-AFC4-6F175D3DCCD1}">
+                <a14:hiddenFill xmlns:a14="http://schemas.microsoft.com/office/drawing/2010/main">
+                  <a:solidFill>
+                    <a:schemeClr val="accent1"/>
+                  </a:solidFill>
+                </a14:hiddenFill>
+              </a:ext>
+              <a:ext uri="{91240B29-F687-4F45-9708-019B960494DF}">
+                <a14:hiddenLine xmlns:a14="http://schemas.microsoft.com/office/drawing/2010/main" w="9525">
+                  <a:solidFill>
+                    <a:schemeClr val="tx1"/>
+                  </a:solidFill>
+                  <a:miter lim="800000"/>
+                  <a:headEnd/>
+                  <a:tailEnd/>
+                </a14:hiddenLine>
+              </a:ext>
+            </a:extLst>
+          </p:spPr>
+        </p:pic>
+        <p:sp>
+          <p:nvSpPr>
+            <p:cNvPr id="4" name="Flowchart: Connector 3"/>
+            <p:cNvSpPr/>
+            <p:nvPr/>
+          </p:nvSpPr>
+          <p:spPr>
+            <a:xfrm>
+              <a:off x="77875" y="4393732"/>
+              <a:ext cx="342900" cy="342900"/>
+            </a:xfrm>
+            <a:prstGeom prst="flowChartConnector">
+              <a:avLst/>
+            </a:prstGeom>
+            <a:solidFill>
+              <a:srgbClr val="0070C0"/>
+            </a:solidFill>
+            <a:effectLst/>
+          </p:spPr>
+          <p:style>
+            <a:lnRef idx="0">
+              <a:schemeClr val="accent2"/>
+            </a:lnRef>
+            <a:fillRef idx="3">
+              <a:schemeClr val="accent2"/>
+            </a:fillRef>
+            <a:effectRef idx="3">
+              <a:schemeClr val="accent2"/>
+            </a:effectRef>
+            <a:fontRef idx="minor">
+              <a:schemeClr val="lt1"/>
+            </a:fontRef>
+          </p:style>
+          <p:txBody>
+            <a:bodyPr lIns="0" tIns="0" rIns="0" bIns="0" rtlCol="0" anchor="ctr"/>
+            <a:lstStyle/>
+            <a:p>
+              <a:pPr algn="ctr"/>
+              <a:r>
+                <a:rPr lang="en-US" sz="1400" dirty="0"/>
+                <a:t>C.1</a:t>
+              </a:r>
+              <a:endParaRPr lang="en-SG" sz="1400" dirty="0"/>
+            </a:p>
+          </p:txBody>
+        </p:sp>
+        <p:sp>
+          <p:nvSpPr>
+            <p:cNvPr id="7" name="Flowchart: Connector 6"/>
+            <p:cNvSpPr/>
+            <p:nvPr/>
+          </p:nvSpPr>
+          <p:spPr>
+            <a:xfrm>
+              <a:off x="2303918" y="3906253"/>
+              <a:ext cx="342900" cy="342900"/>
+            </a:xfrm>
+            <a:prstGeom prst="flowChartConnector">
+              <a:avLst/>
+            </a:prstGeom>
+            <a:solidFill>
+              <a:srgbClr val="00B050"/>
+            </a:solidFill>
+            <a:effectLst/>
+          </p:spPr>
+          <p:style>
+            <a:lnRef idx="0">
+              <a:schemeClr val="accent2"/>
+            </a:lnRef>
+            <a:fillRef idx="3">
+              <a:schemeClr val="accent2"/>
+            </a:fillRef>
+            <a:effectRef idx="3">
+              <a:schemeClr val="accent2"/>
+            </a:effectRef>
+            <a:fontRef idx="minor">
+              <a:schemeClr val="lt1"/>
+            </a:fontRef>
+          </p:style>
+          <p:txBody>
+            <a:bodyPr lIns="0" tIns="0" rIns="0" bIns="0" rtlCol="0" anchor="ctr"/>
+            <a:lstStyle/>
+            <a:p>
+              <a:pPr algn="ctr"/>
+              <a:r>
+                <a:rPr lang="en-US" sz="1400" dirty="0" smtClean="0"/>
+                <a:t>S.1</a:t>
+              </a:r>
+              <a:endParaRPr lang="en-SG" sz="1400" dirty="0"/>
+            </a:p>
+          </p:txBody>
+        </p:sp>
+        <p:sp>
+          <p:nvSpPr>
+            <p:cNvPr id="8" name="Flowchart: Connector 7"/>
+            <p:cNvSpPr/>
+            <p:nvPr/>
+          </p:nvSpPr>
+          <p:spPr>
+            <a:xfrm>
+              <a:off x="5872484" y="3201403"/>
+              <a:ext cx="342900" cy="342900"/>
+            </a:xfrm>
+            <a:prstGeom prst="flowChartConnector">
+              <a:avLst/>
+            </a:prstGeom>
+            <a:solidFill>
+              <a:srgbClr val="0070C0"/>
+            </a:solidFill>
+            <a:effectLst/>
+          </p:spPr>
+          <p:style>
+            <a:lnRef idx="0">
+              <a:schemeClr val="accent2"/>
+            </a:lnRef>
+            <a:fillRef idx="3">
+              <a:schemeClr val="accent2"/>
+            </a:fillRef>
+            <a:effectRef idx="3">
+              <a:schemeClr val="accent2"/>
+            </a:effectRef>
+            <a:fontRef idx="minor">
+              <a:schemeClr val="lt1"/>
+            </a:fontRef>
+          </p:style>
+          <p:txBody>
+            <a:bodyPr lIns="0" tIns="0" rIns="0" bIns="0" rtlCol="0" anchor="ctr"/>
+            <a:lstStyle/>
+            <a:p>
+              <a:pPr algn="ctr"/>
+              <a:r>
+                <a:rPr lang="en-US" sz="1400" dirty="0" smtClean="0"/>
+                <a:t>C.2</a:t>
+              </a:r>
+              <a:endParaRPr lang="en-SG" sz="1400" dirty="0"/>
+            </a:p>
+          </p:txBody>
+        </p:sp>
+        <p:sp>
+          <p:nvSpPr>
+            <p:cNvPr id="9" name="Flowchart: Connector 8"/>
+            <p:cNvSpPr/>
+            <p:nvPr/>
+          </p:nvSpPr>
+          <p:spPr>
+            <a:xfrm>
+              <a:off x="7405908" y="5295900"/>
+              <a:ext cx="342900" cy="342900"/>
+            </a:xfrm>
+            <a:prstGeom prst="flowChartConnector">
+              <a:avLst/>
+            </a:prstGeom>
+            <a:solidFill>
+              <a:srgbClr val="7030A0"/>
+            </a:solidFill>
+            <a:effectLst/>
+          </p:spPr>
+          <p:style>
+            <a:lnRef idx="0">
+              <a:schemeClr val="accent2"/>
+            </a:lnRef>
+            <a:fillRef idx="3">
+              <a:schemeClr val="accent2"/>
+            </a:fillRef>
+            <a:effectRef idx="3">
+              <a:schemeClr val="accent2"/>
+            </a:effectRef>
+            <a:fontRef idx="minor">
+              <a:schemeClr val="lt1"/>
+            </a:fontRef>
+          </p:style>
+          <p:txBody>
+            <a:bodyPr lIns="0" tIns="0" rIns="0" bIns="0" rtlCol="0" anchor="ctr"/>
+            <a:lstStyle/>
+            <a:p>
+              <a:pPr algn="ctr"/>
+              <a:r>
+                <a:rPr lang="en-US" sz="1400" dirty="0" smtClean="0"/>
+                <a:t>L.1</a:t>
+              </a:r>
+              <a:endParaRPr lang="en-SG" sz="1400" dirty="0"/>
+            </a:p>
+          </p:txBody>
+        </p:sp>
+        <p:sp>
+          <p:nvSpPr>
+            <p:cNvPr id="10" name="Flowchart: Connector 9"/>
+            <p:cNvSpPr/>
+            <p:nvPr/>
+          </p:nvSpPr>
+          <p:spPr>
+            <a:xfrm>
+              <a:off x="5142368" y="2437598"/>
+              <a:ext cx="342900" cy="342900"/>
+            </a:xfrm>
+            <a:prstGeom prst="flowChartConnector">
+              <a:avLst/>
+            </a:prstGeom>
+            <a:effectLst/>
+          </p:spPr>
+          <p:style>
+            <a:lnRef idx="0">
+              <a:schemeClr val="accent2"/>
+            </a:lnRef>
+            <a:fillRef idx="3">
+              <a:schemeClr val="accent2"/>
+            </a:fillRef>
+            <a:effectRef idx="3">
+              <a:schemeClr val="accent2"/>
+            </a:effectRef>
+            <a:fontRef idx="minor">
+              <a:schemeClr val="lt1"/>
+            </a:fontRef>
+          </p:style>
+          <p:txBody>
+            <a:bodyPr lIns="0" tIns="0" rIns="0" bIns="0" rtlCol="0" anchor="ctr"/>
+            <a:lstStyle/>
+            <a:p>
+              <a:pPr algn="ctr"/>
+              <a:r>
+                <a:rPr lang="en-US" sz="1400" dirty="0"/>
+                <a:t>A.1</a:t>
+              </a:r>
+              <a:endParaRPr lang="en-SG" sz="1400" dirty="0"/>
+            </a:p>
+          </p:txBody>
+        </p:sp>
+        <p:sp>
+          <p:nvSpPr>
+            <p:cNvPr id="11" name="Flowchart: Connector 10"/>
+            <p:cNvSpPr/>
+            <p:nvPr/>
+          </p:nvSpPr>
+          <p:spPr>
+            <a:xfrm>
+              <a:off x="8399918" y="5295900"/>
+              <a:ext cx="342900" cy="342900"/>
+            </a:xfrm>
+            <a:prstGeom prst="flowChartConnector">
+              <a:avLst/>
+            </a:prstGeom>
+            <a:effectLst/>
+          </p:spPr>
+          <p:style>
+            <a:lnRef idx="0">
+              <a:schemeClr val="accent2"/>
+            </a:lnRef>
+            <a:fillRef idx="3">
+              <a:schemeClr val="accent2"/>
+            </a:fillRef>
+            <a:effectRef idx="3">
+              <a:schemeClr val="accent2"/>
+            </a:effectRef>
+            <a:fontRef idx="minor">
+              <a:schemeClr val="lt1"/>
+            </a:fontRef>
+          </p:style>
+          <p:txBody>
+            <a:bodyPr lIns="0" tIns="0" rIns="0" bIns="0" rtlCol="0" anchor="ctr"/>
+            <a:lstStyle/>
+            <a:p>
+              <a:pPr algn="ctr"/>
+              <a:r>
+                <a:rPr lang="en-US" sz="1400" dirty="0" smtClean="0"/>
+                <a:t>A.2</a:t>
+              </a:r>
+              <a:endParaRPr lang="en-SG" sz="1400" dirty="0"/>
+            </a:p>
+          </p:txBody>
+        </p:sp>
+        <p:sp>
+          <p:nvSpPr>
+            <p:cNvPr id="12" name="Flowchart: Connector 11"/>
+            <p:cNvSpPr/>
+            <p:nvPr/>
+          </p:nvSpPr>
+          <p:spPr>
+            <a:xfrm>
+              <a:off x="7234458" y="1886953"/>
+              <a:ext cx="342900" cy="342900"/>
+            </a:xfrm>
+            <a:prstGeom prst="flowChartConnector">
+              <a:avLst/>
+            </a:prstGeom>
+            <a:solidFill>
+              <a:srgbClr val="00B050"/>
+            </a:solidFill>
+            <a:effectLst/>
+          </p:spPr>
+          <p:style>
+            <a:lnRef idx="0">
+              <a:schemeClr val="accent2"/>
+            </a:lnRef>
+            <a:fillRef idx="3">
+              <a:schemeClr val="accent2"/>
+            </a:fillRef>
+            <a:effectRef idx="3">
+              <a:schemeClr val="accent2"/>
+            </a:effectRef>
+            <a:fontRef idx="minor">
+              <a:schemeClr val="lt1"/>
+            </a:fontRef>
+          </p:style>
+          <p:txBody>
+            <a:bodyPr lIns="0" tIns="0" rIns="0" bIns="0" rtlCol="0" anchor="ctr"/>
+            <a:lstStyle/>
+            <a:p>
+              <a:pPr algn="ctr"/>
+              <a:r>
+                <a:rPr lang="en-US" sz="1400" dirty="0" smtClean="0"/>
+                <a:t>S.2</a:t>
+              </a:r>
+              <a:endParaRPr lang="en-SG" sz="1400" dirty="0"/>
+            </a:p>
+          </p:txBody>
+        </p:sp>
+        <p:sp>
+          <p:nvSpPr>
+            <p:cNvPr id="5" name="Left Brace 4"/>
+            <p:cNvSpPr/>
+            <p:nvPr/>
+          </p:nvSpPr>
+          <p:spPr>
+            <a:xfrm rot="16200000">
+              <a:off x="7521913" y="4503520"/>
+              <a:ext cx="228600" cy="1222610"/>
+            </a:xfrm>
+            <a:prstGeom prst="leftBrace">
+              <a:avLst/>
+            </a:prstGeom>
+            <a:ln w="28575">
+              <a:solidFill>
+                <a:srgbClr val="7030A0"/>
+              </a:solidFill>
+            </a:ln>
+          </p:spPr>
+          <p:style>
+            <a:lnRef idx="1">
+              <a:schemeClr val="accent1"/>
+            </a:lnRef>
+            <a:fillRef idx="0">
+              <a:schemeClr val="accent1"/>
+            </a:fillRef>
+            <a:effectRef idx="0">
+              <a:schemeClr val="accent1"/>
+            </a:effectRef>
+            <a:fontRef idx="minor">
+              <a:schemeClr val="tx1"/>
+            </a:fontRef>
+          </p:style>
+          <p:txBody>
+            <a:bodyPr rtlCol="0" anchor="ctr"/>
+            <a:lstStyle/>
+            <a:p>
+              <a:pPr algn="ctr"/>
+              <a:endParaRPr lang="en-SG"/>
+            </a:p>
+          </p:txBody>
+        </p:sp>
+        <p:cxnSp>
+          <p:nvCxnSpPr>
+            <p:cNvPr id="13" name="Straight Arrow Connector 12"/>
+            <p:cNvCxnSpPr/>
+            <p:nvPr/>
+          </p:nvCxnSpPr>
+          <p:spPr>
+            <a:xfrm flipV="1">
+              <a:off x="8571368" y="4896853"/>
+              <a:ext cx="0" cy="332272"/>
+            </a:xfrm>
+            <a:prstGeom prst="straightConnector1">
+              <a:avLst/>
+            </a:prstGeom>
+            <a:ln w="28575">
+              <a:solidFill>
+                <a:srgbClr val="C00000"/>
+              </a:solidFill>
+              <a:headEnd type="none" w="med" len="med"/>
+              <a:tailEnd type="triangle" w="med" len="med"/>
+            </a:ln>
+          </p:spPr>
+          <p:style>
+            <a:lnRef idx="1">
+              <a:schemeClr val="accent1"/>
+            </a:lnRef>
+            <a:fillRef idx="0">
+              <a:schemeClr val="accent1"/>
+            </a:fillRef>
+            <a:effectRef idx="0">
+              <a:schemeClr val="accent1"/>
+            </a:effectRef>
+            <a:fontRef idx="minor">
+              <a:schemeClr val="tx1"/>
+            </a:fontRef>
+          </p:style>
+        </p:cxnSp>
+        <p:sp>
+          <p:nvSpPr>
+            <p:cNvPr id="16" name="Left Brace 15"/>
+            <p:cNvSpPr/>
+            <p:nvPr/>
+          </p:nvSpPr>
+          <p:spPr>
+            <a:xfrm rot="10800000">
+              <a:off x="6910608" y="1772653"/>
+              <a:ext cx="228600" cy="664945"/>
+            </a:xfrm>
+            <a:prstGeom prst="leftBrace">
+              <a:avLst/>
+            </a:prstGeom>
+            <a:ln w="28575">
+              <a:solidFill>
+                <a:srgbClr val="00B050"/>
+              </a:solidFill>
+            </a:ln>
+          </p:spPr>
+          <p:style>
+            <a:lnRef idx="1">
+              <a:schemeClr val="accent1"/>
+            </a:lnRef>
+            <a:fillRef idx="0">
+              <a:schemeClr val="accent1"/>
+            </a:fillRef>
+            <a:effectRef idx="0">
+              <a:schemeClr val="accent1"/>
+            </a:effectRef>
+            <a:fontRef idx="minor">
+              <a:schemeClr val="tx1"/>
+            </a:fontRef>
+          </p:style>
+          <p:txBody>
+            <a:bodyPr rtlCol="0" anchor="ctr"/>
+            <a:lstStyle/>
+            <a:p>
+              <a:pPr algn="ctr"/>
+              <a:endParaRPr lang="en-SG"/>
+            </a:p>
+          </p:txBody>
+        </p:sp>
+      </p:grpSp>
+    </p:spTree>
+    <p:extLst>
+      <p:ext uri="{BB962C8B-B14F-4D97-AF65-F5344CB8AC3E}">
+        <p14:creationId xmlns:p14="http://schemas.microsoft.com/office/powerpoint/2010/main" val="1689468278"/>
+      </p:ext>
+    </p:extLst>
+  </p:cSld>
+  <p:clrMapOvr>
+    <a:masterClrMapping/>
+  </p:clrMapOvr>
+  <p:timing>
+    <p:tnLst>
+      <p:par>
+        <p:cTn id="1" dur="indefinite" restart="never" nodeType="tmRoot"/>
+      </p:par>
+    </p:tnLst>
+  </p:timing>
+</p:sld>
 </file>
 
 <file path=ppt/theme/theme1.xml><?xml version="1.0" encoding="utf-8"?>

</xml_diff>